<commit_message>
Atualização do Doc Apresentação
</commit_message>
<xml_diff>
--- a/DOCUMENTAÇÃO TCC/Apresentação do TCC.pptx
+++ b/DOCUMENTAÇÃO TCC/Apresentação do TCC.pptx
@@ -235,7 +235,7 @@
             <a:pPr rtl="0"/>
             <a:fld id="{5C3E0910-793C-46A0-8623-CEAD4857882F}" type="datetime1">
               <a:rPr lang="pt-BR" smtClean="0"/>
-              <a:t>06/12/2022</a:t>
+              <a:t>07/12/2022</a:t>
             </a:fld>
             <a:endParaRPr lang="en-US" dirty="0"/>
           </a:p>
@@ -405,7 +405,7 @@
             <a:pPr rtl="0"/>
             <a:fld id="{49EE704A-765A-48C7-8594-25B15929F837}" type="datetime1">
               <a:rPr lang="pt-BR" smtClean="0"/>
-              <a:t>06/12/2022</a:t>
+              <a:t>07/12/2022</a:t>
             </a:fld>
             <a:endParaRPr lang="en-US"/>
           </a:p>
@@ -925,7 +925,7 @@
             <a:pPr rtl="0"/>
             <a:fld id="{3E92B5B4-4D0A-4964-A1A3-B85B0EE00890}" type="datetime1">
               <a:rPr lang="pt-BR" smtClean="0"/>
-              <a:t>06/12/2022</a:t>
+              <a:t>07/12/2022</a:t>
             </a:fld>
             <a:endParaRPr lang="en-US" dirty="0"/>
           </a:p>
@@ -1121,7 +1121,7 @@
             <a:pPr rtl="0"/>
             <a:fld id="{32E1A5F9-C71D-4DE8-8BF4-9F6FC06A94B8}" type="datetime1">
               <a:rPr lang="pt-BR" smtClean="0"/>
-              <a:t>06/12/2022</a:t>
+              <a:t>07/12/2022</a:t>
             </a:fld>
             <a:endParaRPr lang="en-US" dirty="0"/>
           </a:p>
@@ -1371,7 +1371,7 @@
             <a:pPr rtl="0"/>
             <a:fld id="{421DCD7D-5BFD-485D-AED5-B62EAACA4CB6}" type="datetime1">
               <a:rPr lang="pt-BR" smtClean="0"/>
-              <a:t>06/12/2022</a:t>
+              <a:t>07/12/2022</a:t>
             </a:fld>
             <a:endParaRPr lang="en-US" dirty="0"/>
           </a:p>
@@ -1594,7 +1594,7 @@
             <a:pPr rtl="0"/>
             <a:fld id="{3E92B5B4-4D0A-4964-A1A3-B85B0EE00890}" type="datetime1">
               <a:rPr lang="pt-BR" smtClean="0"/>
-              <a:t>06/12/2022</a:t>
+              <a:t>07/12/2022</a:t>
             </a:fld>
             <a:endParaRPr lang="en-US" dirty="0"/>
           </a:p>
@@ -1795,7 +1795,7 @@
             <a:pPr rtl="0"/>
             <a:fld id="{623252B5-F3E6-4058-A723-196087E9E541}" type="datetime1">
               <a:rPr lang="pt-BR" smtClean="0"/>
-              <a:t>06/12/2022</a:t>
+              <a:t>07/12/2022</a:t>
             </a:fld>
             <a:endParaRPr lang="en-US" dirty="0"/>
           </a:p>
@@ -2073,7 +2073,7 @@
             <a:pPr rtl="0"/>
             <a:fld id="{1A251DFA-97D2-4C90-9100-D1173CC96C37}" type="datetime1">
               <a:rPr lang="pt-BR" smtClean="0"/>
-              <a:t>06/12/2022</a:t>
+              <a:t>07/12/2022</a:t>
             </a:fld>
             <a:endParaRPr lang="en-US" dirty="0"/>
           </a:p>
@@ -2341,7 +2341,7 @@
             <a:pPr rtl="0"/>
             <a:fld id="{7651B26C-F0DB-4889-B6A3-FE07E152272F}" type="datetime1">
               <a:rPr lang="pt-BR" smtClean="0"/>
-              <a:t>06/12/2022</a:t>
+              <a:t>07/12/2022</a:t>
             </a:fld>
             <a:endParaRPr lang="en-US" dirty="0"/>
           </a:p>
@@ -2756,7 +2756,7 @@
             <a:pPr rtl="0"/>
             <a:fld id="{DB0565EE-A4B5-4AB4-9432-D16ECAE9EF1F}" type="datetime1">
               <a:rPr lang="pt-BR" smtClean="0"/>
-              <a:t>06/12/2022</a:t>
+              <a:t>07/12/2022</a:t>
             </a:fld>
             <a:endParaRPr lang="en-US" dirty="0"/>
           </a:p>
@@ -2900,7 +2900,7 @@
             <a:pPr rtl="0"/>
             <a:fld id="{66BA6665-D630-4C43-9989-3D086DA68E5F}" type="datetime1">
               <a:rPr lang="pt-BR" smtClean="0"/>
-              <a:t>06/12/2022</a:t>
+              <a:t>07/12/2022</a:t>
             </a:fld>
             <a:endParaRPr lang="en-US" dirty="0"/>
           </a:p>
@@ -3017,7 +3017,7 @@
             <a:pPr rtl="0"/>
             <a:fld id="{66BA6665-D630-4C43-9989-3D086DA68E5F}" type="datetime1">
               <a:rPr lang="pt-BR" smtClean="0"/>
-              <a:t>06/12/2022</a:t>
+              <a:t>07/12/2022</a:t>
             </a:fld>
             <a:endParaRPr lang="en-US" dirty="0"/>
           </a:p>
@@ -3332,7 +3332,7 @@
             <a:pPr rtl="0"/>
             <a:fld id="{6F5D5688-1774-4625-9E74-88EA94DB2550}" type="datetime1">
               <a:rPr lang="pt-BR" smtClean="0"/>
-              <a:t>06/12/2022</a:t>
+              <a:t>07/12/2022</a:t>
             </a:fld>
             <a:endParaRPr lang="en-US" dirty="0"/>
           </a:p>
@@ -3529,7 +3529,7 @@
             <a:pPr rtl="0"/>
             <a:fld id="{623252B5-F3E6-4058-A723-196087E9E541}" type="datetime1">
               <a:rPr lang="pt-BR" smtClean="0"/>
-              <a:t>06/12/2022</a:t>
+              <a:t>07/12/2022</a:t>
             </a:fld>
             <a:endParaRPr lang="en-US" dirty="0"/>
           </a:p>
@@ -3820,7 +3820,7 @@
             <a:pPr rtl="0"/>
             <a:fld id="{3D5E4E1C-696A-4E82-B6DD-87ECA4CC925A}" type="datetime1">
               <a:rPr lang="pt-BR" smtClean="0"/>
-              <a:t>06/12/2022</a:t>
+              <a:t>07/12/2022</a:t>
             </a:fld>
             <a:endParaRPr lang="en-US" dirty="0"/>
           </a:p>
@@ -4021,7 +4021,7 @@
             <a:pPr rtl="0"/>
             <a:fld id="{66BA6665-D630-4C43-9989-3D086DA68E5F}" type="datetime1">
               <a:rPr lang="pt-BR" smtClean="0"/>
-              <a:t>06/12/2022</a:t>
+              <a:t>07/12/2022</a:t>
             </a:fld>
             <a:endParaRPr lang="en-US" dirty="0"/>
           </a:p>
@@ -4233,7 +4233,7 @@
             <a:pPr rtl="0"/>
             <a:fld id="{421DCD7D-5BFD-485D-AED5-B62EAACA4CB6}" type="datetime1">
               <a:rPr lang="pt-BR" smtClean="0"/>
-              <a:t>06/12/2022</a:t>
+              <a:t>07/12/2022</a:t>
             </a:fld>
             <a:endParaRPr lang="en-US" dirty="0"/>
           </a:p>
@@ -4610,7 +4610,7 @@
             <a:pPr rtl="0"/>
             <a:fld id="{1A251DFA-97D2-4C90-9100-D1173CC96C37}" type="datetime1">
               <a:rPr lang="pt-BR" smtClean="0"/>
-              <a:t>06/12/2022</a:t>
+              <a:t>07/12/2022</a:t>
             </a:fld>
             <a:endParaRPr lang="en-US" dirty="0"/>
           </a:p>
@@ -4869,7 +4869,7 @@
             <a:pPr rtl="0"/>
             <a:fld id="{7651B26C-F0DB-4889-B6A3-FE07E152272F}" type="datetime1">
               <a:rPr lang="pt-BR" smtClean="0"/>
-              <a:t>06/12/2022</a:t>
+              <a:t>07/12/2022</a:t>
             </a:fld>
             <a:endParaRPr lang="en-US" dirty="0"/>
           </a:p>
@@ -5274,7 +5274,7 @@
             <a:pPr rtl="0"/>
             <a:fld id="{DB0565EE-A4B5-4AB4-9432-D16ECAE9EF1F}" type="datetime1">
               <a:rPr lang="pt-BR" smtClean="0"/>
-              <a:t>06/12/2022</a:t>
+              <a:t>07/12/2022</a:t>
             </a:fld>
             <a:endParaRPr lang="en-US" dirty="0"/>
           </a:p>
@@ -5414,7 +5414,7 @@
             <a:pPr rtl="0"/>
             <a:fld id="{FC470C2D-02C8-4A1B-A79F-498A53DD951F}" type="datetime1">
               <a:rPr lang="pt-BR" smtClean="0"/>
-              <a:t>06/12/2022</a:t>
+              <a:t>07/12/2022</a:t>
             </a:fld>
             <a:endParaRPr lang="en-US" dirty="0"/>
           </a:p>
@@ -5574,7 +5574,7 @@
             <a:pPr rtl="0"/>
             <a:fld id="{9094EF83-1835-4C7A-B4B2-F0B720F5AC0B}" type="datetime1">
               <a:rPr lang="pt-BR" smtClean="0"/>
-              <a:t>06/12/2022</a:t>
+              <a:t>07/12/2022</a:t>
             </a:fld>
             <a:endParaRPr lang="en-US" dirty="0"/>
           </a:p>
@@ -5907,7 +5907,7 @@
             <a:pPr rtl="0"/>
             <a:fld id="{6F5D5688-1774-4625-9E74-88EA94DB2550}" type="datetime1">
               <a:rPr lang="pt-BR" smtClean="0"/>
-              <a:t>06/12/2022</a:t>
+              <a:t>07/12/2022</a:t>
             </a:fld>
             <a:endParaRPr lang="en-US" dirty="0"/>
           </a:p>
@@ -6262,7 +6262,7 @@
             <a:pPr rtl="0"/>
             <a:fld id="{3D5E4E1C-696A-4E82-B6DD-87ECA4CC925A}" type="datetime1">
               <a:rPr lang="pt-BR" smtClean="0"/>
-              <a:t>06/12/2022</a:t>
+              <a:t>07/12/2022</a:t>
             </a:fld>
             <a:endParaRPr lang="en-US" dirty="0"/>
           </a:p>
@@ -6526,7 +6526,7 @@
             <a:pPr rtl="0"/>
             <a:fld id="{66BA6665-D630-4C43-9989-3D086DA68E5F}" type="datetime1">
               <a:rPr lang="pt-BR" smtClean="0"/>
-              <a:t>06/12/2022</a:t>
+              <a:t>07/12/2022</a:t>
             </a:fld>
             <a:endParaRPr lang="en-US" dirty="0"/>
           </a:p>
@@ -7203,7 +7203,7 @@
             <a:pPr rtl="0"/>
             <a:fld id="{66BA6665-D630-4C43-9989-3D086DA68E5F}" type="datetime1">
               <a:rPr lang="pt-BR" smtClean="0"/>
-              <a:t>06/12/2022</a:t>
+              <a:t>07/12/2022</a:t>
             </a:fld>
             <a:endParaRPr lang="en-US" dirty="0"/>
           </a:p>
@@ -8582,12 +8582,12 @@
         <p:spPr>
           <a:xfrm>
             <a:off x="838200" y="3209519"/>
-            <a:ext cx="10515600" cy="1826715"/>
+            <a:ext cx="10515600" cy="2026360"/>
           </a:xfrm>
         </p:spPr>
         <p:txBody>
           <a:bodyPr>
-            <a:normAutofit lnSpcReduction="10000"/>
+            <a:normAutofit fontScale="92500" lnSpcReduction="20000"/>
           </a:bodyPr>
           <a:lstStyle/>
           <a:p>
@@ -8628,6 +8628,18 @@
               <a:rPr lang="pt-BR" dirty="0"/>
               <a:t>IDE Lazarus;</a:t>
             </a:r>
+          </a:p>
+          <a:p>
+            <a:pPr algn="just"/>
+            <a:r>
+              <a:rPr lang="pt-BR" dirty="0"/>
+              <a:t>GitHub Pela IDE </a:t>
+            </a:r>
+            <a:r>
+              <a:rPr lang="pt-BR" dirty="0" err="1"/>
+              <a:t>GitKraken</a:t>
+            </a:r>
+            <a:endParaRPr lang="pt-BR" dirty="0"/>
           </a:p>
           <a:p>
             <a:pPr marL="0" indent="0" algn="just">
@@ -10049,8 +10061,8 @@
         </p:nvSpPr>
         <p:spPr>
           <a:xfrm>
-            <a:off x="8622874" y="4232217"/>
-            <a:ext cx="2581284" cy="369332"/>
+            <a:off x="8622873" y="4232217"/>
+            <a:ext cx="3569127" cy="369332"/>
           </a:xfrm>
           <a:prstGeom prst="rect">
             <a:avLst/>
@@ -10082,7 +10094,7 @@
           <a:p>
             <a:r>
               <a:rPr lang="pt-BR" b="1" dirty="0"/>
-              <a:t>Controle Contas/Receber</a:t>
+              <a:t>Controle Contas Pagar/Receber</a:t>
             </a:r>
           </a:p>
         </p:txBody>
@@ -10201,6 +10213,7 @@
             </a:extLst>
           </p:cNvPr>
           <p:cNvCxnSpPr>
+            <a:cxnSpLocks/>
             <a:stCxn id="23" idx="1"/>
             <a:endCxn id="43" idx="1"/>
           </p:cNvCxnSpPr>
@@ -10208,12 +10221,12 @@
         </p:nvCxnSpPr>
         <p:spPr>
           <a:xfrm rot="10800000" flipH="1" flipV="1">
-            <a:off x="8356600" y="3853729"/>
-            <a:ext cx="266274" cy="563154"/>
+            <a:off x="8356599" y="3853729"/>
+            <a:ext cx="266273" cy="563154"/>
           </a:xfrm>
           <a:prstGeom prst="bentConnector3">
             <a:avLst>
-              <a:gd name="adj1" fmla="val -85851"/>
+              <a:gd name="adj1" fmla="val -85852"/>
             </a:avLst>
           </a:prstGeom>
           <a:ln>

</xml_diff>